<commit_message>
locdir used in website
</commit_message>
<xml_diff>
--- a/misc/vign/PackageSchematic.pptx
+++ b/misc/vign/PackageSchematic.pptx
@@ -264,7 +264,7 @@
           <a:p>
             <a:fld id="{300DB245-849F-4AAA-AD3E-676A6FA9CB3B}" type="datetimeFigureOut">
               <a:rPr lang="de-DE" smtClean="0"/>
-              <a:t>30.07.2020</a:t>
+              <a:t>09.06.2021</a:t>
             </a:fld>
             <a:endParaRPr lang="de-DE"/>
           </a:p>
@@ -434,7 +434,7 @@
           <a:p>
             <a:fld id="{300DB245-849F-4AAA-AD3E-676A6FA9CB3B}" type="datetimeFigureOut">
               <a:rPr lang="de-DE" smtClean="0"/>
-              <a:t>30.07.2020</a:t>
+              <a:t>09.06.2021</a:t>
             </a:fld>
             <a:endParaRPr lang="de-DE"/>
           </a:p>
@@ -614,7 +614,7 @@
           <a:p>
             <a:fld id="{300DB245-849F-4AAA-AD3E-676A6FA9CB3B}" type="datetimeFigureOut">
               <a:rPr lang="de-DE" smtClean="0"/>
-              <a:t>30.07.2020</a:t>
+              <a:t>09.06.2021</a:t>
             </a:fld>
             <a:endParaRPr lang="de-DE"/>
           </a:p>
@@ -784,7 +784,7 @@
           <a:p>
             <a:fld id="{300DB245-849F-4AAA-AD3E-676A6FA9CB3B}" type="datetimeFigureOut">
               <a:rPr lang="de-DE" smtClean="0"/>
-              <a:t>30.07.2020</a:t>
+              <a:t>09.06.2021</a:t>
             </a:fld>
             <a:endParaRPr lang="de-DE"/>
           </a:p>
@@ -1028,7 +1028,7 @@
           <a:p>
             <a:fld id="{300DB245-849F-4AAA-AD3E-676A6FA9CB3B}" type="datetimeFigureOut">
               <a:rPr lang="de-DE" smtClean="0"/>
-              <a:t>30.07.2020</a:t>
+              <a:t>09.06.2021</a:t>
             </a:fld>
             <a:endParaRPr lang="de-DE"/>
           </a:p>
@@ -1260,7 +1260,7 @@
           <a:p>
             <a:fld id="{300DB245-849F-4AAA-AD3E-676A6FA9CB3B}" type="datetimeFigureOut">
               <a:rPr lang="de-DE" smtClean="0"/>
-              <a:t>30.07.2020</a:t>
+              <a:t>09.06.2021</a:t>
             </a:fld>
             <a:endParaRPr lang="de-DE"/>
           </a:p>
@@ -1627,7 +1627,7 @@
           <a:p>
             <a:fld id="{300DB245-849F-4AAA-AD3E-676A6FA9CB3B}" type="datetimeFigureOut">
               <a:rPr lang="de-DE" smtClean="0"/>
-              <a:t>30.07.2020</a:t>
+              <a:t>09.06.2021</a:t>
             </a:fld>
             <a:endParaRPr lang="de-DE"/>
           </a:p>
@@ -1745,7 +1745,7 @@
           <a:p>
             <a:fld id="{300DB245-849F-4AAA-AD3E-676A6FA9CB3B}" type="datetimeFigureOut">
               <a:rPr lang="de-DE" smtClean="0"/>
-              <a:t>30.07.2020</a:t>
+              <a:t>09.06.2021</a:t>
             </a:fld>
             <a:endParaRPr lang="de-DE"/>
           </a:p>
@@ -1840,7 +1840,7 @@
           <a:p>
             <a:fld id="{300DB245-849F-4AAA-AD3E-676A6FA9CB3B}" type="datetimeFigureOut">
               <a:rPr lang="de-DE" smtClean="0"/>
-              <a:t>30.07.2020</a:t>
+              <a:t>09.06.2021</a:t>
             </a:fld>
             <a:endParaRPr lang="de-DE"/>
           </a:p>
@@ -2117,7 +2117,7 @@
           <a:p>
             <a:fld id="{300DB245-849F-4AAA-AD3E-676A6FA9CB3B}" type="datetimeFigureOut">
               <a:rPr lang="de-DE" smtClean="0"/>
-              <a:t>30.07.2020</a:t>
+              <a:t>09.06.2021</a:t>
             </a:fld>
             <a:endParaRPr lang="de-DE"/>
           </a:p>
@@ -2374,7 +2374,7 @@
           <a:p>
             <a:fld id="{300DB245-849F-4AAA-AD3E-676A6FA9CB3B}" type="datetimeFigureOut">
               <a:rPr lang="de-DE" smtClean="0"/>
-              <a:t>30.07.2020</a:t>
+              <a:t>09.06.2021</a:t>
             </a:fld>
             <a:endParaRPr lang="de-DE"/>
           </a:p>
@@ -2587,7 +2587,7 @@
           <a:p>
             <a:fld id="{300DB245-849F-4AAA-AD3E-676A6FA9CB3B}" type="datetimeFigureOut">
               <a:rPr lang="de-DE" smtClean="0"/>
-              <a:t>30.07.2020</a:t>
+              <a:t>09.06.2021</a:t>
             </a:fld>
             <a:endParaRPr lang="de-DE"/>
           </a:p>
@@ -5960,7 +5960,7 @@
                   <a:schemeClr val="tx1"/>
                 </a:solidFill>
               </a:rPr>
-              <a:t>localtestdir</a:t>
+              <a:t>locdir</a:t>
             </a:r>
           </a:p>
           <a:p>

</xml_diff>